<commit_message>
mise a jour de mon pp
</commit_message>
<xml_diff>
--- a/Présentation/merkya.pptx
+++ b/Présentation/merkya.pptx
@@ -4,6 +4,9 @@
   <p:sldMasterIdLst>
     <p:sldMasterId id="2147483660" r:id="rId1"/>
   </p:sldMasterIdLst>
+  <p:notesMasterIdLst>
+    <p:notesMasterId r:id="rId12"/>
+  </p:notesMasterIdLst>
   <p:sldIdLst>
     <p:sldId id="256" r:id="rId2"/>
     <p:sldId id="263" r:id="rId3"/>
@@ -13,7 +16,8 @@
     <p:sldId id="260" r:id="rId7"/>
     <p:sldId id="262" r:id="rId8"/>
     <p:sldId id="264" r:id="rId9"/>
-    <p:sldId id="261" r:id="rId10"/>
+    <p:sldId id="265" r:id="rId10"/>
+    <p:sldId id="261" r:id="rId11"/>
   </p:sldIdLst>
   <p:sldSz cx="12192000" cy="6858000"/>
   <p:notesSz cx="6858000" cy="9144000"/>
@@ -120,6 +124,440 @@
 </p:presentation>
 </file>
 
+<file path=ppt/notesMasters/notesMaster1.xml><?xml version="1.0" encoding="utf-8"?>
+<p:notesMaster xmlns:a="http://schemas.openxmlformats.org/drawingml/2006/main" xmlns:r="http://schemas.openxmlformats.org/officeDocument/2006/relationships" xmlns:p="http://schemas.openxmlformats.org/presentationml/2006/main">
+  <p:cSld>
+    <p:bg>
+      <p:bgRef idx="1001">
+        <a:schemeClr val="bg1"/>
+      </p:bgRef>
+    </p:bg>
+    <p:spTree>
+      <p:nvGrpSpPr>
+        <p:cNvPr id="1" name=""/>
+        <p:cNvGrpSpPr/>
+        <p:nvPr/>
+      </p:nvGrpSpPr>
+      <p:grpSpPr>
+        <a:xfrm>
+          <a:off x="0" y="0"/>
+          <a:ext cx="0" cy="0"/>
+          <a:chOff x="0" y="0"/>
+          <a:chExt cx="0" cy="0"/>
+        </a:xfrm>
+      </p:grpSpPr>
+      <p:sp>
+        <p:nvSpPr>
+          <p:cNvPr id="2" name="Espace réservé de l'en-tête 1"/>
+          <p:cNvSpPr>
+            <a:spLocks noGrp="1"/>
+          </p:cNvSpPr>
+          <p:nvPr>
+            <p:ph type="hdr" sz="quarter"/>
+          </p:nvPr>
+        </p:nvSpPr>
+        <p:spPr>
+          <a:xfrm>
+            <a:off x="0" y="0"/>
+            <a:ext cx="2971800" cy="458788"/>
+          </a:xfrm>
+          <a:prstGeom prst="rect">
+            <a:avLst/>
+          </a:prstGeom>
+        </p:spPr>
+        <p:txBody>
+          <a:bodyPr vert="horz" lIns="91440" tIns="45720" rIns="91440" bIns="45720" rtlCol="0"/>
+          <a:lstStyle>
+            <a:lvl1pPr algn="l">
+              <a:defRPr sz="1200"/>
+            </a:lvl1pPr>
+          </a:lstStyle>
+          <a:p>
+            <a:endParaRPr lang="fr-CH"/>
+          </a:p>
+        </p:txBody>
+      </p:sp>
+      <p:sp>
+        <p:nvSpPr>
+          <p:cNvPr id="3" name="Espace réservé de la date 2"/>
+          <p:cNvSpPr>
+            <a:spLocks noGrp="1"/>
+          </p:cNvSpPr>
+          <p:nvPr>
+            <p:ph type="dt" idx="1"/>
+          </p:nvPr>
+        </p:nvSpPr>
+        <p:spPr>
+          <a:xfrm>
+            <a:off x="3884613" y="0"/>
+            <a:ext cx="2971800" cy="458788"/>
+          </a:xfrm>
+          <a:prstGeom prst="rect">
+            <a:avLst/>
+          </a:prstGeom>
+        </p:spPr>
+        <p:txBody>
+          <a:bodyPr vert="horz" lIns="91440" tIns="45720" rIns="91440" bIns="45720" rtlCol="0"/>
+          <a:lstStyle>
+            <a:lvl1pPr algn="r">
+              <a:defRPr sz="1200"/>
+            </a:lvl1pPr>
+          </a:lstStyle>
+          <a:p>
+            <a:fld id="{5C88DEFE-52DC-490C-9332-511E95F513DE}" type="datetimeFigureOut">
+              <a:rPr lang="fr-CH" smtClean="0"/>
+              <a:t>16.12.2016</a:t>
+            </a:fld>
+            <a:endParaRPr lang="fr-CH"/>
+          </a:p>
+        </p:txBody>
+      </p:sp>
+      <p:sp>
+        <p:nvSpPr>
+          <p:cNvPr id="4" name="Espace réservé de l'image des diapositives 3"/>
+          <p:cNvSpPr>
+            <a:spLocks noGrp="1" noRot="1" noChangeAspect="1"/>
+          </p:cNvSpPr>
+          <p:nvPr>
+            <p:ph type="sldImg" idx="2"/>
+          </p:nvPr>
+        </p:nvSpPr>
+        <p:spPr>
+          <a:xfrm>
+            <a:off x="685800" y="1143000"/>
+            <a:ext cx="5486400" cy="3086100"/>
+          </a:xfrm>
+          <a:prstGeom prst="rect">
+            <a:avLst/>
+          </a:prstGeom>
+          <a:noFill/>
+          <a:ln w="12700">
+            <a:solidFill>
+              <a:prstClr val="black"/>
+            </a:solidFill>
+          </a:ln>
+        </p:spPr>
+        <p:txBody>
+          <a:bodyPr vert="horz" lIns="91440" tIns="45720" rIns="91440" bIns="45720" rtlCol="0" anchor="ctr"/>
+          <a:lstStyle/>
+          <a:p>
+            <a:endParaRPr lang="fr-CH"/>
+          </a:p>
+        </p:txBody>
+      </p:sp>
+      <p:sp>
+        <p:nvSpPr>
+          <p:cNvPr id="5" name="Espace réservé des notes 4"/>
+          <p:cNvSpPr>
+            <a:spLocks noGrp="1"/>
+          </p:cNvSpPr>
+          <p:nvPr>
+            <p:ph type="body" sz="quarter" idx="3"/>
+          </p:nvPr>
+        </p:nvSpPr>
+        <p:spPr>
+          <a:xfrm>
+            <a:off x="685800" y="4400550"/>
+            <a:ext cx="5486400" cy="3600450"/>
+          </a:xfrm>
+          <a:prstGeom prst="rect">
+            <a:avLst/>
+          </a:prstGeom>
+        </p:spPr>
+        <p:txBody>
+          <a:bodyPr vert="horz" lIns="91440" tIns="45720" rIns="91440" bIns="45720" rtlCol="0"/>
+          <a:lstStyle/>
+          <a:p>
+            <a:pPr lvl="0"/>
+            <a:r>
+              <a:rPr lang="fr-FR" smtClean="0"/>
+              <a:t>Modifier les styles du texte du masque</a:t>
+            </a:r>
+          </a:p>
+          <a:p>
+            <a:pPr lvl="1"/>
+            <a:r>
+              <a:rPr lang="fr-FR" smtClean="0"/>
+              <a:t>Deuxième niveau</a:t>
+            </a:r>
+          </a:p>
+          <a:p>
+            <a:pPr lvl="2"/>
+            <a:r>
+              <a:rPr lang="fr-FR" smtClean="0"/>
+              <a:t>Troisième niveau</a:t>
+            </a:r>
+          </a:p>
+          <a:p>
+            <a:pPr lvl="3"/>
+            <a:r>
+              <a:rPr lang="fr-FR" smtClean="0"/>
+              <a:t>Quatrième niveau</a:t>
+            </a:r>
+          </a:p>
+          <a:p>
+            <a:pPr lvl="4"/>
+            <a:r>
+              <a:rPr lang="fr-FR" smtClean="0"/>
+              <a:t>Cinquième niveau</a:t>
+            </a:r>
+            <a:endParaRPr lang="fr-CH"/>
+          </a:p>
+        </p:txBody>
+      </p:sp>
+      <p:sp>
+        <p:nvSpPr>
+          <p:cNvPr id="6" name="Espace réservé du pied de page 5"/>
+          <p:cNvSpPr>
+            <a:spLocks noGrp="1"/>
+          </p:cNvSpPr>
+          <p:nvPr>
+            <p:ph type="ftr" sz="quarter" idx="4"/>
+          </p:nvPr>
+        </p:nvSpPr>
+        <p:spPr>
+          <a:xfrm>
+            <a:off x="0" y="8685213"/>
+            <a:ext cx="2971800" cy="458787"/>
+          </a:xfrm>
+          <a:prstGeom prst="rect">
+            <a:avLst/>
+          </a:prstGeom>
+        </p:spPr>
+        <p:txBody>
+          <a:bodyPr vert="horz" lIns="91440" tIns="45720" rIns="91440" bIns="45720" rtlCol="0" anchor="b"/>
+          <a:lstStyle>
+            <a:lvl1pPr algn="l">
+              <a:defRPr sz="1200"/>
+            </a:lvl1pPr>
+          </a:lstStyle>
+          <a:p>
+            <a:endParaRPr lang="fr-CH"/>
+          </a:p>
+        </p:txBody>
+      </p:sp>
+      <p:sp>
+        <p:nvSpPr>
+          <p:cNvPr id="7" name="Espace réservé du numéro de diapositive 6"/>
+          <p:cNvSpPr>
+            <a:spLocks noGrp="1"/>
+          </p:cNvSpPr>
+          <p:nvPr>
+            <p:ph type="sldNum" sz="quarter" idx="5"/>
+          </p:nvPr>
+        </p:nvSpPr>
+        <p:spPr>
+          <a:xfrm>
+            <a:off x="3884613" y="8685213"/>
+            <a:ext cx="2971800" cy="458787"/>
+          </a:xfrm>
+          <a:prstGeom prst="rect">
+            <a:avLst/>
+          </a:prstGeom>
+        </p:spPr>
+        <p:txBody>
+          <a:bodyPr vert="horz" lIns="91440" tIns="45720" rIns="91440" bIns="45720" rtlCol="0" anchor="b"/>
+          <a:lstStyle>
+            <a:lvl1pPr algn="r">
+              <a:defRPr sz="1200"/>
+            </a:lvl1pPr>
+          </a:lstStyle>
+          <a:p>
+            <a:fld id="{BFDFC339-FBEA-4475-A1B4-789B53904622}" type="slidenum">
+              <a:rPr lang="fr-CH" smtClean="0"/>
+              <a:t>‹N°›</a:t>
+            </a:fld>
+            <a:endParaRPr lang="fr-CH"/>
+          </a:p>
+        </p:txBody>
+      </p:sp>
+    </p:spTree>
+    <p:extLst>
+      <p:ext uri="{BB962C8B-B14F-4D97-AF65-F5344CB8AC3E}">
+        <p14:creationId xmlns:p14="http://schemas.microsoft.com/office/powerpoint/2010/main" val="1971855407"/>
+      </p:ext>
+    </p:extLst>
+  </p:cSld>
+  <p:clrMap bg1="lt1" tx1="dk1" bg2="lt2" tx2="dk2" accent1="accent1" accent2="accent2" accent3="accent3" accent4="accent4" accent5="accent5" accent6="accent6" hlink="hlink" folHlink="folHlink"/>
+  <p:notesStyle>
+    <a:lvl1pPr marL="0" algn="l" defTabSz="914400" rtl="0" eaLnBrk="1" latinLnBrk="0" hangingPunct="1">
+      <a:defRPr sz="1200" kern="1200">
+        <a:solidFill>
+          <a:schemeClr val="tx1"/>
+        </a:solidFill>
+        <a:latin typeface="+mn-lt"/>
+        <a:ea typeface="+mn-ea"/>
+        <a:cs typeface="+mn-cs"/>
+      </a:defRPr>
+    </a:lvl1pPr>
+    <a:lvl2pPr marL="457200" algn="l" defTabSz="914400" rtl="0" eaLnBrk="1" latinLnBrk="0" hangingPunct="1">
+      <a:defRPr sz="1200" kern="1200">
+        <a:solidFill>
+          <a:schemeClr val="tx1"/>
+        </a:solidFill>
+        <a:latin typeface="+mn-lt"/>
+        <a:ea typeface="+mn-ea"/>
+        <a:cs typeface="+mn-cs"/>
+      </a:defRPr>
+    </a:lvl2pPr>
+    <a:lvl3pPr marL="914400" algn="l" defTabSz="914400" rtl="0" eaLnBrk="1" latinLnBrk="0" hangingPunct="1">
+      <a:defRPr sz="1200" kern="1200">
+        <a:solidFill>
+          <a:schemeClr val="tx1"/>
+        </a:solidFill>
+        <a:latin typeface="+mn-lt"/>
+        <a:ea typeface="+mn-ea"/>
+        <a:cs typeface="+mn-cs"/>
+      </a:defRPr>
+    </a:lvl3pPr>
+    <a:lvl4pPr marL="1371600" algn="l" defTabSz="914400" rtl="0" eaLnBrk="1" latinLnBrk="0" hangingPunct="1">
+      <a:defRPr sz="1200" kern="1200">
+        <a:solidFill>
+          <a:schemeClr val="tx1"/>
+        </a:solidFill>
+        <a:latin typeface="+mn-lt"/>
+        <a:ea typeface="+mn-ea"/>
+        <a:cs typeface="+mn-cs"/>
+      </a:defRPr>
+    </a:lvl4pPr>
+    <a:lvl5pPr marL="1828800" algn="l" defTabSz="914400" rtl="0" eaLnBrk="1" latinLnBrk="0" hangingPunct="1">
+      <a:defRPr sz="1200" kern="1200">
+        <a:solidFill>
+          <a:schemeClr val="tx1"/>
+        </a:solidFill>
+        <a:latin typeface="+mn-lt"/>
+        <a:ea typeface="+mn-ea"/>
+        <a:cs typeface="+mn-cs"/>
+      </a:defRPr>
+    </a:lvl5pPr>
+    <a:lvl6pPr marL="2286000" algn="l" defTabSz="914400" rtl="0" eaLnBrk="1" latinLnBrk="0" hangingPunct="1">
+      <a:defRPr sz="1200" kern="1200">
+        <a:solidFill>
+          <a:schemeClr val="tx1"/>
+        </a:solidFill>
+        <a:latin typeface="+mn-lt"/>
+        <a:ea typeface="+mn-ea"/>
+        <a:cs typeface="+mn-cs"/>
+      </a:defRPr>
+    </a:lvl6pPr>
+    <a:lvl7pPr marL="2743200" algn="l" defTabSz="914400" rtl="0" eaLnBrk="1" latinLnBrk="0" hangingPunct="1">
+      <a:defRPr sz="1200" kern="1200">
+        <a:solidFill>
+          <a:schemeClr val="tx1"/>
+        </a:solidFill>
+        <a:latin typeface="+mn-lt"/>
+        <a:ea typeface="+mn-ea"/>
+        <a:cs typeface="+mn-cs"/>
+      </a:defRPr>
+    </a:lvl7pPr>
+    <a:lvl8pPr marL="3200400" algn="l" defTabSz="914400" rtl="0" eaLnBrk="1" latinLnBrk="0" hangingPunct="1">
+      <a:defRPr sz="1200" kern="1200">
+        <a:solidFill>
+          <a:schemeClr val="tx1"/>
+        </a:solidFill>
+        <a:latin typeface="+mn-lt"/>
+        <a:ea typeface="+mn-ea"/>
+        <a:cs typeface="+mn-cs"/>
+      </a:defRPr>
+    </a:lvl8pPr>
+    <a:lvl9pPr marL="3657600" algn="l" defTabSz="914400" rtl="0" eaLnBrk="1" latinLnBrk="0" hangingPunct="1">
+      <a:defRPr sz="1200" kern="1200">
+        <a:solidFill>
+          <a:schemeClr val="tx1"/>
+        </a:solidFill>
+        <a:latin typeface="+mn-lt"/>
+        <a:ea typeface="+mn-ea"/>
+        <a:cs typeface="+mn-cs"/>
+      </a:defRPr>
+    </a:lvl9pPr>
+  </p:notesStyle>
+</p:notesMaster>
+</file>
+
+<file path=ppt/notesSlides/notesSlide1.xml><?xml version="1.0" encoding="utf-8"?>
+<p:notes xmlns:a="http://schemas.openxmlformats.org/drawingml/2006/main" xmlns:r="http://schemas.openxmlformats.org/officeDocument/2006/relationships" xmlns:p="http://schemas.openxmlformats.org/presentationml/2006/main">
+  <p:cSld>
+    <p:spTree>
+      <p:nvGrpSpPr>
+        <p:cNvPr id="1" name=""/>
+        <p:cNvGrpSpPr/>
+        <p:nvPr/>
+      </p:nvGrpSpPr>
+      <p:grpSpPr>
+        <a:xfrm>
+          <a:off x="0" y="0"/>
+          <a:ext cx="0" cy="0"/>
+          <a:chOff x="0" y="0"/>
+          <a:chExt cx="0" cy="0"/>
+        </a:xfrm>
+      </p:grpSpPr>
+      <p:sp>
+        <p:nvSpPr>
+          <p:cNvPr id="2" name="Espace réservé de l'image des diapositives 1"/>
+          <p:cNvSpPr>
+            <a:spLocks noGrp="1" noRot="1" noChangeAspect="1"/>
+          </p:cNvSpPr>
+          <p:nvPr>
+            <p:ph type="sldImg"/>
+          </p:nvPr>
+        </p:nvSpPr>
+        <p:spPr/>
+      </p:sp>
+      <p:sp>
+        <p:nvSpPr>
+          <p:cNvPr id="3" name="Espace réservé des notes 2"/>
+          <p:cNvSpPr>
+            <a:spLocks noGrp="1"/>
+          </p:cNvSpPr>
+          <p:nvPr>
+            <p:ph type="body" idx="1"/>
+          </p:nvPr>
+        </p:nvSpPr>
+        <p:spPr/>
+        <p:txBody>
+          <a:bodyPr/>
+          <a:lstStyle/>
+          <a:p>
+            <a:endParaRPr lang="fr-CH" dirty="0"/>
+          </a:p>
+        </p:txBody>
+      </p:sp>
+      <p:sp>
+        <p:nvSpPr>
+          <p:cNvPr id="4" name="Espace réservé du numéro de diapositive 3"/>
+          <p:cNvSpPr>
+            <a:spLocks noGrp="1"/>
+          </p:cNvSpPr>
+          <p:nvPr>
+            <p:ph type="sldNum" sz="quarter" idx="10"/>
+          </p:nvPr>
+        </p:nvSpPr>
+        <p:spPr/>
+        <p:txBody>
+          <a:bodyPr/>
+          <a:lstStyle/>
+          <a:p>
+            <a:fld id="{BFDFC339-FBEA-4475-A1B4-789B53904622}" type="slidenum">
+              <a:rPr lang="fr-CH" smtClean="0"/>
+              <a:t>7</a:t>
+            </a:fld>
+            <a:endParaRPr lang="fr-CH"/>
+          </a:p>
+        </p:txBody>
+      </p:sp>
+    </p:spTree>
+    <p:extLst>
+      <p:ext uri="{BB962C8B-B14F-4D97-AF65-F5344CB8AC3E}">
+        <p14:creationId xmlns:p14="http://schemas.microsoft.com/office/powerpoint/2010/main" val="2536130498"/>
+      </p:ext>
+    </p:extLst>
+  </p:cSld>
+  <p:clrMapOvr>
+    <a:masterClrMapping/>
+  </p:clrMapOvr>
+</p:notes>
+</file>
+
 <file path=ppt/slideLayouts/slideLayout1.xml><?xml version="1.0" encoding="utf-8"?>
 <p:sldLayout xmlns:a="http://schemas.openxmlformats.org/drawingml/2006/main" xmlns:r="http://schemas.openxmlformats.org/officeDocument/2006/relationships" xmlns:p="http://schemas.openxmlformats.org/presentationml/2006/main" type="title" preserve="1">
   <p:cSld name="Diapositive de titre">
@@ -305,7 +743,7 @@
           <a:p>
             <a:fld id="{FF38B628-3581-4A00-9B3B-E92F5EBE601F}" type="datetimeFigureOut">
               <a:rPr lang="fr-CH" smtClean="0"/>
-              <a:t>14.12.2016</a:t>
+              <a:t>16.12.2016</a:t>
             </a:fld>
             <a:endParaRPr lang="fr-CH"/>
           </a:p>
@@ -613,7 +1051,7 @@
           <a:p>
             <a:fld id="{FF38B628-3581-4A00-9B3B-E92F5EBE601F}" type="datetimeFigureOut">
               <a:rPr lang="fr-CH" smtClean="0"/>
-              <a:t>14.12.2016</a:t>
+              <a:t>16.12.2016</a:t>
             </a:fld>
             <a:endParaRPr lang="fr-CH"/>
           </a:p>
@@ -805,7 +1243,7 @@
           <a:p>
             <a:fld id="{FF38B628-3581-4A00-9B3B-E92F5EBE601F}" type="datetimeFigureOut">
               <a:rPr lang="fr-CH" smtClean="0"/>
-              <a:t>14.12.2016</a:t>
+              <a:t>16.12.2016</a:t>
             </a:fld>
             <a:endParaRPr lang="fr-CH"/>
           </a:p>
@@ -1066,7 +1504,7 @@
           <a:p>
             <a:fld id="{FF38B628-3581-4A00-9B3B-E92F5EBE601F}" type="datetimeFigureOut">
               <a:rPr lang="fr-CH" smtClean="0"/>
-              <a:t>14.12.2016</a:t>
+              <a:t>16.12.2016</a:t>
             </a:fld>
             <a:endParaRPr lang="fr-CH"/>
           </a:p>
@@ -1490,7 +1928,7 @@
           <a:p>
             <a:fld id="{FF38B628-3581-4A00-9B3B-E92F5EBE601F}" type="datetimeFigureOut">
               <a:rPr lang="fr-CH" smtClean="0"/>
-              <a:t>14.12.2016</a:t>
+              <a:t>16.12.2016</a:t>
             </a:fld>
             <a:endParaRPr lang="fr-CH"/>
           </a:p>
@@ -2027,7 +2465,7 @@
           <a:p>
             <a:fld id="{FF38B628-3581-4A00-9B3B-E92F5EBE601F}" type="datetimeFigureOut">
               <a:rPr lang="fr-CH" smtClean="0"/>
-              <a:t>14.12.2016</a:t>
+              <a:t>16.12.2016</a:t>
             </a:fld>
             <a:endParaRPr lang="fr-CH"/>
           </a:p>
@@ -2891,7 +3329,7 @@
           <a:p>
             <a:fld id="{FF38B628-3581-4A00-9B3B-E92F5EBE601F}" type="datetimeFigureOut">
               <a:rPr lang="fr-CH" smtClean="0"/>
-              <a:t>14.12.2016</a:t>
+              <a:t>16.12.2016</a:t>
             </a:fld>
             <a:endParaRPr lang="fr-CH"/>
           </a:p>
@@ -3061,7 +3499,7 @@
           <a:p>
             <a:fld id="{FF38B628-3581-4A00-9B3B-E92F5EBE601F}" type="datetimeFigureOut">
               <a:rPr lang="fr-CH" smtClean="0"/>
-              <a:t>14.12.2016</a:t>
+              <a:t>16.12.2016</a:t>
             </a:fld>
             <a:endParaRPr lang="fr-CH"/>
           </a:p>
@@ -3255,7 +3693,7 @@
           <a:p>
             <a:fld id="{FF38B628-3581-4A00-9B3B-E92F5EBE601F}" type="datetimeFigureOut">
               <a:rPr lang="fr-CH" smtClean="0"/>
-              <a:t>14.12.2016</a:t>
+              <a:t>16.12.2016</a:t>
             </a:fld>
             <a:endParaRPr lang="fr-CH"/>
           </a:p>
@@ -3435,7 +3873,7 @@
           <a:p>
             <a:fld id="{FF38B628-3581-4A00-9B3B-E92F5EBE601F}" type="datetimeFigureOut">
               <a:rPr lang="fr-CH" smtClean="0"/>
-              <a:t>14.12.2016</a:t>
+              <a:t>16.12.2016</a:t>
             </a:fld>
             <a:endParaRPr lang="fr-CH"/>
           </a:p>
@@ -3689,7 +4127,7 @@
           <a:p>
             <a:fld id="{FF38B628-3581-4A00-9B3B-E92F5EBE601F}" type="datetimeFigureOut">
               <a:rPr lang="fr-CH" smtClean="0"/>
-              <a:t>14.12.2016</a:t>
+              <a:t>16.12.2016</a:t>
             </a:fld>
             <a:endParaRPr lang="fr-CH"/>
           </a:p>
@@ -3935,7 +4373,7 @@
           <a:p>
             <a:fld id="{FF38B628-3581-4A00-9B3B-E92F5EBE601F}" type="datetimeFigureOut">
               <a:rPr lang="fr-CH" smtClean="0"/>
-              <a:t>14.12.2016</a:t>
+              <a:t>16.12.2016</a:t>
             </a:fld>
             <a:endParaRPr lang="fr-CH"/>
           </a:p>
@@ -4411,7 +4849,7 @@
           <a:p>
             <a:fld id="{FF38B628-3581-4A00-9B3B-E92F5EBE601F}" type="datetimeFigureOut">
               <a:rPr lang="fr-CH" smtClean="0"/>
-              <a:t>14.12.2016</a:t>
+              <a:t>16.12.2016</a:t>
             </a:fld>
             <a:endParaRPr lang="fr-CH"/>
           </a:p>
@@ -4539,7 +4977,7 @@
           <a:p>
             <a:fld id="{FF38B628-3581-4A00-9B3B-E92F5EBE601F}" type="datetimeFigureOut">
               <a:rPr lang="fr-CH" smtClean="0"/>
-              <a:t>14.12.2016</a:t>
+              <a:t>16.12.2016</a:t>
             </a:fld>
             <a:endParaRPr lang="fr-CH"/>
           </a:p>
@@ -4644,7 +5082,7 @@
           <a:p>
             <a:fld id="{FF38B628-3581-4A00-9B3B-E92F5EBE601F}" type="datetimeFigureOut">
               <a:rPr lang="fr-CH" smtClean="0"/>
-              <a:t>14.12.2016</a:t>
+              <a:t>16.12.2016</a:t>
             </a:fld>
             <a:endParaRPr lang="fr-CH"/>
           </a:p>
@@ -4909,7 +5347,7 @@
           <a:p>
             <a:fld id="{FF38B628-3581-4A00-9B3B-E92F5EBE601F}" type="datetimeFigureOut">
               <a:rPr lang="fr-CH" smtClean="0"/>
-              <a:t>14.12.2016</a:t>
+              <a:t>16.12.2016</a:t>
             </a:fld>
             <a:endParaRPr lang="fr-CH"/>
           </a:p>
@@ -5219,7 +5657,7 @@
           <a:p>
             <a:fld id="{FF38B628-3581-4A00-9B3B-E92F5EBE601F}" type="datetimeFigureOut">
               <a:rPr lang="fr-CH" smtClean="0"/>
-              <a:t>14.12.2016</a:t>
+              <a:t>16.12.2016</a:t>
             </a:fld>
             <a:endParaRPr lang="fr-CH"/>
           </a:p>
@@ -5463,7 +5901,7 @@
           <a:p>
             <a:fld id="{FF38B628-3581-4A00-9B3B-E92F5EBE601F}" type="datetimeFigureOut">
               <a:rPr lang="fr-CH" smtClean="0"/>
-              <a:t>14.12.2016</a:t>
+              <a:t>16.12.2016</a:t>
             </a:fld>
             <a:endParaRPr lang="fr-CH"/>
           </a:p>
@@ -6216,6 +6654,170 @@
 </p:sld>
 </file>
 
+<file path=ppt/slides/slide10.xml><?xml version="1.0" encoding="utf-8"?>
+<p:sld xmlns:a="http://schemas.openxmlformats.org/drawingml/2006/main" xmlns:r="http://schemas.openxmlformats.org/officeDocument/2006/relationships" xmlns:p="http://schemas.openxmlformats.org/presentationml/2006/main">
+  <p:cSld>
+    <p:spTree>
+      <p:nvGrpSpPr>
+        <p:cNvPr id="1" name=""/>
+        <p:cNvGrpSpPr/>
+        <p:nvPr/>
+      </p:nvGrpSpPr>
+      <p:grpSpPr>
+        <a:xfrm>
+          <a:off x="0" y="0"/>
+          <a:ext cx="0" cy="0"/>
+          <a:chOff x="0" y="0"/>
+          <a:chExt cx="0" cy="0"/>
+        </a:xfrm>
+      </p:grpSpPr>
+      <p:sp>
+        <p:nvSpPr>
+          <p:cNvPr id="2" name="Titre 1"/>
+          <p:cNvSpPr>
+            <a:spLocks noGrp="1"/>
+          </p:cNvSpPr>
+          <p:nvPr>
+            <p:ph type="title"/>
+          </p:nvPr>
+        </p:nvSpPr>
+        <p:spPr/>
+        <p:txBody>
+          <a:bodyPr/>
+          <a:lstStyle/>
+          <a:p>
+            <a:pPr algn="ctr"/>
+            <a:r>
+              <a:rPr lang="fr-CH" dirty="0" smtClean="0"/>
+              <a:t>JDT</a:t>
+            </a:r>
+            <a:endParaRPr lang="fr-CH" dirty="0"/>
+          </a:p>
+        </p:txBody>
+      </p:sp>
+      <p:pic>
+        <p:nvPicPr>
+          <p:cNvPr id="6" name="Image 5"/>
+          <p:cNvPicPr>
+            <a:picLocks noChangeAspect="1"/>
+          </p:cNvPicPr>
+          <p:nvPr/>
+        </p:nvPicPr>
+        <p:blipFill>
+          <a:blip r:embed="rId2"/>
+          <a:stretch>
+            <a:fillRect/>
+          </a:stretch>
+        </p:blipFill>
+        <p:spPr>
+          <a:xfrm>
+            <a:off x="113308" y="2345946"/>
+            <a:ext cx="11954735" cy="2235739"/>
+          </a:xfrm>
+          <a:prstGeom prst="rect">
+            <a:avLst/>
+          </a:prstGeom>
+        </p:spPr>
+      </p:pic>
+    </p:spTree>
+    <p:extLst>
+      <p:ext uri="{BB962C8B-B14F-4D97-AF65-F5344CB8AC3E}">
+        <p14:creationId xmlns:p14="http://schemas.microsoft.com/office/powerpoint/2010/main" val="4147630261"/>
+      </p:ext>
+    </p:extLst>
+  </p:cSld>
+  <p:clrMapOvr>
+    <a:masterClrMapping/>
+  </p:clrMapOvr>
+  <p:transition>
+    <p:push dir="u"/>
+  </p:transition>
+  <p:timing>
+    <p:tnLst>
+      <p:par>
+        <p:cTn id="1" dur="indefinite" restart="never" nodeType="tmRoot">
+          <p:childTnLst>
+            <p:seq concurrent="1" nextAc="seek">
+              <p:cTn id="2" dur="indefinite" nodeType="mainSeq">
+                <p:childTnLst>
+                  <p:par>
+                    <p:cTn id="3" fill="hold">
+                      <p:stCondLst>
+                        <p:cond delay="indefinite"/>
+                      </p:stCondLst>
+                      <p:childTnLst>
+                        <p:par>
+                          <p:cTn id="4" fill="hold">
+                            <p:stCondLst>
+                              <p:cond delay="0"/>
+                            </p:stCondLst>
+                            <p:childTnLst>
+                              <p:par>
+                                <p:cTn id="5" presetID="10" presetClass="entr" presetSubtype="0" fill="hold" nodeType="clickEffect">
+                                  <p:stCondLst>
+                                    <p:cond delay="0"/>
+                                  </p:stCondLst>
+                                  <p:childTnLst>
+                                    <p:set>
+                                      <p:cBhvr>
+                                        <p:cTn id="6" dur="1" fill="hold">
+                                          <p:stCondLst>
+                                            <p:cond delay="0"/>
+                                          </p:stCondLst>
+                                        </p:cTn>
+                                        <p:tgtEl>
+                                          <p:spTgt spid="6"/>
+                                        </p:tgtEl>
+                                        <p:attrNameLst>
+                                          <p:attrName>style.visibility</p:attrName>
+                                        </p:attrNameLst>
+                                      </p:cBhvr>
+                                      <p:to>
+                                        <p:strVal val="visible"/>
+                                      </p:to>
+                                    </p:set>
+                                    <p:animEffect transition="in" filter="fade">
+                                      <p:cBhvr>
+                                        <p:cTn id="7" dur="250"/>
+                                        <p:tgtEl>
+                                          <p:spTgt spid="6"/>
+                                        </p:tgtEl>
+                                      </p:cBhvr>
+                                    </p:animEffect>
+                                  </p:childTnLst>
+                                </p:cTn>
+                              </p:par>
+                            </p:childTnLst>
+                          </p:cTn>
+                        </p:par>
+                      </p:childTnLst>
+                    </p:cTn>
+                  </p:par>
+                </p:childTnLst>
+              </p:cTn>
+              <p:prevCondLst>
+                <p:cond evt="onPrev" delay="0">
+                  <p:tgtEl>
+                    <p:sldTgt/>
+                  </p:tgtEl>
+                </p:cond>
+              </p:prevCondLst>
+              <p:nextCondLst>
+                <p:cond evt="onNext" delay="0">
+                  <p:tgtEl>
+                    <p:sldTgt/>
+                  </p:tgtEl>
+                </p:cond>
+              </p:nextCondLst>
+            </p:seq>
+          </p:childTnLst>
+        </p:cTn>
+      </p:par>
+    </p:tnLst>
+  </p:timing>
+</p:sld>
+</file>
+
 <file path=ppt/slides/slide2.xml><?xml version="1.0" encoding="utf-8"?>
 <p:sld xmlns:a="http://schemas.openxmlformats.org/drawingml/2006/main" xmlns:r="http://schemas.openxmlformats.org/officeDocument/2006/relationships" xmlns:p="http://schemas.openxmlformats.org/presentationml/2006/main">
   <p:cSld>
@@ -6671,30 +7273,21 @@
                             </p:childTnLst>
                           </p:cTn>
                         </p:par>
-                      </p:childTnLst>
-                    </p:cTn>
-                  </p:par>
-                  <p:par>
-                    <p:cTn id="28" fill="hold">
-                      <p:stCondLst>
-                        <p:cond delay="indefinite"/>
-                      </p:stCondLst>
-                      <p:childTnLst>
                         <p:par>
-                          <p:cTn id="29" fill="hold">
+                          <p:cTn id="28" fill="hold">
                             <p:stCondLst>
-                              <p:cond delay="0"/>
+                              <p:cond delay="720"/>
                             </p:stCondLst>
                             <p:childTnLst>
                               <p:par>
-                                <p:cTn id="30" presetID="10" presetClass="entr" presetSubtype="0" fill="hold" grpId="0" nodeType="clickEffect">
+                                <p:cTn id="29" presetID="10" presetClass="entr" presetSubtype="0" fill="hold" grpId="0" nodeType="afterEffect">
                                   <p:stCondLst>
                                     <p:cond delay="0"/>
                                   </p:stCondLst>
                                   <p:childTnLst>
                                     <p:set>
                                       <p:cBhvr>
-                                        <p:cTn id="31" dur="1" fill="hold">
+                                        <p:cTn id="30" dur="1" fill="hold">
                                           <p:stCondLst>
                                             <p:cond delay="0"/>
                                           </p:stCondLst>
@@ -6716,7 +7309,7 @@
                                     </p:set>
                                     <p:animEffect transition="in" filter="fade">
                                       <p:cBhvr>
-                                        <p:cTn id="32" dur="120"/>
+                                        <p:cTn id="31" dur="120"/>
                                         <p:tgtEl>
                                           <p:spTgt spid="118">
                                             <p:txEl>
@@ -6733,20 +7326,20 @@
                           </p:cTn>
                         </p:par>
                         <p:par>
-                          <p:cTn id="33" fill="hold">
+                          <p:cTn id="32" fill="hold">
                             <p:stCondLst>
-                              <p:cond delay="120"/>
+                              <p:cond delay="840"/>
                             </p:stCondLst>
                             <p:childTnLst>
                               <p:par>
-                                <p:cTn id="34" presetID="10" presetClass="entr" presetSubtype="0" fill="hold" grpId="0" nodeType="afterEffect">
+                                <p:cTn id="33" presetID="10" presetClass="entr" presetSubtype="0" fill="hold" grpId="0" nodeType="afterEffect">
                                   <p:stCondLst>
                                     <p:cond delay="0"/>
                                   </p:stCondLst>
                                   <p:childTnLst>
                                     <p:set>
                                       <p:cBhvr>
-                                        <p:cTn id="35" dur="1" fill="hold">
+                                        <p:cTn id="34" dur="1" fill="hold">
                                           <p:stCondLst>
                                             <p:cond delay="0"/>
                                           </p:stCondLst>
@@ -6768,7 +7361,7 @@
                                     </p:set>
                                     <p:animEffect transition="in" filter="fade">
                                       <p:cBhvr>
-                                        <p:cTn id="36" dur="120"/>
+                                        <p:cTn id="35" dur="120"/>
                                         <p:tgtEl>
                                           <p:spTgt spid="118">
                                             <p:txEl>
@@ -6809,7 +7402,7 @@
       </p:par>
     </p:tnLst>
     <p:bldLst>
-      <p:bldP spid="118" grpId="0" build="p"/>
+      <p:bldP spid="118" grpId="0" uiExpand="1" build="p"/>
     </p:bldLst>
   </p:timing>
 </p:sld>
@@ -8029,7 +8622,7 @@
                                           </p:stCondLst>
                                         </p:cTn>
                                         <p:tgtEl>
-                                          <p:spTgt spid="10"/>
+                                          <p:spTgt spid="12"/>
                                         </p:tgtEl>
                                         <p:attrNameLst>
                                           <p:attrName>style.visibility</p:attrName>
@@ -8043,7 +8636,7 @@
                                       <p:cBhvr>
                                         <p:cTn id="27" dur="250"/>
                                         <p:tgtEl>
-                                          <p:spTgt spid="10"/>
+                                          <p:spTgt spid="12"/>
                                         </p:tgtEl>
                                       </p:cBhvr>
                                     </p:animEffect>
@@ -8082,7 +8675,7 @@
                                           </p:stCondLst>
                                         </p:cTn>
                                         <p:tgtEl>
-                                          <p:spTgt spid="12"/>
+                                          <p:spTgt spid="10"/>
                                         </p:tgtEl>
                                         <p:attrNameLst>
                                           <p:attrName>style.visibility</p:attrName>
@@ -8096,7 +8689,7 @@
                                       <p:cBhvr>
                                         <p:cTn id="32" dur="250"/>
                                         <p:tgtEl>
-                                          <p:spTgt spid="12"/>
+                                          <p:spTgt spid="10"/>
                                         </p:tgtEl>
                                       </p:cBhvr>
                                     </p:animEffect>
@@ -8188,7 +8781,7 @@
                                           </p:stCondLst>
                                         </p:cTn>
                                         <p:tgtEl>
-                                          <p:spTgt spid="27"/>
+                                          <p:spTgt spid="16"/>
                                         </p:tgtEl>
                                         <p:attrNameLst>
                                           <p:attrName>style.visibility</p:attrName>
@@ -8202,7 +8795,7 @@
                                       <p:cBhvr>
                                         <p:cTn id="42" dur="250"/>
                                         <p:tgtEl>
-                                          <p:spTgt spid="27"/>
+                                          <p:spTgt spid="16"/>
                                         </p:tgtEl>
                                       </p:cBhvr>
                                     </p:animEffect>
@@ -8241,7 +8834,7 @@
                                           </p:stCondLst>
                                         </p:cTn>
                                         <p:tgtEl>
-                                          <p:spTgt spid="16"/>
+                                          <p:spTgt spid="27"/>
                                         </p:tgtEl>
                                         <p:attrNameLst>
                                           <p:attrName>style.visibility</p:attrName>
@@ -8255,7 +8848,7 @@
                                       <p:cBhvr>
                                         <p:cTn id="47" dur="250"/>
                                         <p:tgtEl>
-                                          <p:spTgt spid="16"/>
+                                          <p:spTgt spid="27"/>
                                         </p:tgtEl>
                                       </p:cBhvr>
                                     </p:animEffect>
@@ -8310,6 +8903,30 @@
           <a:chExt cx="0" cy="0"/>
         </a:xfrm>
       </p:grpSpPr>
+      <p:pic>
+        <p:nvPicPr>
+          <p:cNvPr id="5" name="Image 4"/>
+          <p:cNvPicPr>
+            <a:picLocks noChangeAspect="1"/>
+          </p:cNvPicPr>
+          <p:nvPr/>
+        </p:nvPicPr>
+        <p:blipFill>
+          <a:blip r:embed="rId3"/>
+          <a:stretch>
+            <a:fillRect/>
+          </a:stretch>
+        </p:blipFill>
+        <p:spPr>
+          <a:xfrm>
+            <a:off x="444890" y="6858000"/>
+            <a:ext cx="9107171" cy="69389784"/>
+          </a:xfrm>
+          <a:prstGeom prst="rect">
+            <a:avLst/>
+          </a:prstGeom>
+        </p:spPr>
+      </p:pic>
       <p:sp>
         <p:nvSpPr>
           <p:cNvPr id="2" name="Titre 1"/>
@@ -8348,7 +8965,7 @@
           <a:bodyPr/>
           <a:lstStyle/>
           <a:p>
-            <a:endParaRPr lang="fr-CH"/>
+            <a:endParaRPr lang="fr-CH" dirty="0"/>
           </a:p>
         </p:txBody>
       </p:sp>
@@ -8361,14 +8978,14 @@
           <p:nvPr/>
         </p:nvPicPr>
         <p:blipFill>
-          <a:blip r:embed="rId2"/>
+          <a:blip r:embed="rId4"/>
           <a:stretch>
             <a:fillRect/>
           </a:stretch>
         </p:blipFill>
         <p:spPr>
           <a:xfrm>
-            <a:off x="2022933" y="6858000"/>
+            <a:off x="4056515" y="6858000"/>
             <a:ext cx="8135485" cy="23520507"/>
           </a:xfrm>
           <a:prstGeom prst="rect">
@@ -8410,14 +9027,36 @@
                             </p:stCondLst>
                             <p:childTnLst>
                               <p:par>
-                                <p:cTn id="5" presetID="42" presetClass="path" presetSubtype="0" fill="hold" nodeType="clickEffect">
+                                <p:cTn id="5" presetID="42" presetClass="path" presetSubtype="0" fill="hold" grpId="0" nodeType="clickEffect">
                                   <p:stCondLst>
                                     <p:cond delay="0"/>
                                   </p:stCondLst>
                                   <p:childTnLst>
-                                    <p:animMotion origin="layout" path="M 8.33333E-7 -4.81481E-6 L 8.33333E-7 -4.42592 " pathEditMode="relative" rAng="0" ptsTypes="AA">
+                                    <p:animMotion origin="layout" path="M 6.25E-7 -7.40741E-7 L 6.25E-7 -2.05949 " pathEditMode="relative" rAng="0" ptsTypes="AA">
                                       <p:cBhvr>
-                                        <p:cTn id="6" dur="15000" fill="hold"/>
+                                        <p:cTn id="6" dur="4000" fill="hold"/>
+                                        <p:tgtEl>
+                                          <p:spTgt spid="2"/>
+                                        </p:tgtEl>
+                                        <p:attrNameLst>
+                                          <p:attrName>ppt_x</p:attrName>
+                                          <p:attrName>ppt_y</p:attrName>
+                                        </p:attrNameLst>
+                                      </p:cBhvr>
+                                      <p:rCtr x="0" y="-102963"/>
+                                    </p:animMotion>
+                                  </p:childTnLst>
+                                </p:cTn>
+                              </p:par>
+                              <p:par>
+                                <p:cTn id="7" presetID="42" presetClass="path" presetSubtype="0" fill="hold" nodeType="withEffect">
+                                  <p:stCondLst>
+                                    <p:cond delay="0"/>
+                                  </p:stCondLst>
+                                  <p:childTnLst>
+                                    <p:animMotion origin="layout" path="M 3.95833E-6 -4.81481E-6 L 3.95833E-6 -4.42592 " pathEditMode="relative" rAng="0" ptsTypes="AA">
+                                      <p:cBhvr>
+                                        <p:cTn id="8" dur="4000" fill="hold"/>
                                         <p:tgtEl>
                                           <p:spTgt spid="4"/>
                                         </p:tgtEl>
@@ -8432,23 +9071,23 @@
                                 </p:cTn>
                               </p:par>
                               <p:par>
-                                <p:cTn id="7" presetID="42" presetClass="path" presetSubtype="0" fill="hold" grpId="0" nodeType="withEffect">
+                                <p:cTn id="9" presetID="42" presetClass="path" presetSubtype="0" fill="hold" nodeType="withEffect">
                                   <p:stCondLst>
                                     <p:cond delay="0"/>
                                   </p:stCondLst>
                                   <p:childTnLst>
-                                    <p:animMotion origin="layout" path="M 6.25E-7 -7.40741E-7 L 6.25E-7 -2.05949 " pathEditMode="relative" rAng="0" ptsTypes="AA">
+                                    <p:animMotion origin="layout" path="M 4.16667E-6 2.22222E-6 L 4.16667E-6 -11.1382 " pathEditMode="relative" rAng="0" ptsTypes="AA">
                                       <p:cBhvr>
-                                        <p:cTn id="8" dur="10000" fill="hold"/>
+                                        <p:cTn id="10" dur="4000" fill="hold"/>
                                         <p:tgtEl>
-                                          <p:spTgt spid="2"/>
+                                          <p:spTgt spid="5"/>
                                         </p:tgtEl>
                                         <p:attrNameLst>
                                           <p:attrName>ppt_x</p:attrName>
                                           <p:attrName>ppt_y</p:attrName>
                                         </p:attrNameLst>
                                       </p:cBhvr>
-                                      <p:rCtr x="0" y="-102963"/>
+                                      <p:rCtr x="0" y="-556921"/>
                                     </p:animMotion>
                                   </p:childTnLst>
                                 </p:cTn>
@@ -8541,7 +9180,12 @@
             <p:ph idx="1"/>
           </p:nvPr>
         </p:nvSpPr>
-        <p:spPr/>
+        <p:spPr>
+          <a:xfrm>
+            <a:off x="913795" y="2799249"/>
+            <a:ext cx="10353762" cy="4058751"/>
+          </a:xfrm>
+        </p:spPr>
         <p:txBody>
           <a:bodyPr>
             <a:normAutofit/>
@@ -8555,6 +9199,12 @@
               <a:rPr lang="fr-CH" sz="3200" dirty="0" smtClean="0"/>
               <a:t>Réalisateur</a:t>
             </a:r>
+          </a:p>
+          <a:p>
+            <a:pPr marL="36900" indent="0" algn="ctr">
+              <a:buNone/>
+            </a:pPr>
+            <a:endParaRPr lang="fr-CH" sz="3200" dirty="0" smtClean="0"/>
           </a:p>
           <a:p>
             <a:pPr marL="36900" indent="0" algn="ctr">
@@ -8669,7 +9319,7 @@
                                         <p:tgtEl>
                                           <p:spTgt spid="3">
                                             <p:txEl>
-                                              <p:pRg st="1" end="1"/>
+                                              <p:pRg st="2" end="2"/>
                                             </p:txEl>
                                           </p:spTgt>
                                         </p:tgtEl>
@@ -8687,7 +9337,7 @@
                                         <p:tgtEl>
                                           <p:spTgt spid="3">
                                             <p:txEl>
-                                              <p:pRg st="1" end="1"/>
+                                              <p:pRg st="2" end="2"/>
                                             </p:txEl>
                                           </p:spTgt>
                                         </p:tgtEl>
@@ -8762,18 +9412,36 @@
           <a:bodyPr/>
           <a:lstStyle/>
           <a:p>
-            <a:pPr algn="ctr"/>
             <a:r>
               <a:rPr lang="fr-CH" dirty="0" smtClean="0"/>
-              <a:t>JDT</a:t>
+              <a:t>Exemple d’User Story</a:t>
             </a:r>
             <a:endParaRPr lang="fr-CH" dirty="0"/>
+          </a:p>
+        </p:txBody>
+      </p:sp>
+      <p:sp>
+        <p:nvSpPr>
+          <p:cNvPr id="3" name="Espace réservé du contenu 2"/>
+          <p:cNvSpPr>
+            <a:spLocks noGrp="1"/>
+          </p:cNvSpPr>
+          <p:nvPr>
+            <p:ph idx="1"/>
+          </p:nvPr>
+        </p:nvSpPr>
+        <p:spPr/>
+        <p:txBody>
+          <a:bodyPr/>
+          <a:lstStyle/>
+          <a:p>
+            <a:endParaRPr lang="fr-CH"/>
           </a:p>
         </p:txBody>
       </p:sp>
       <p:pic>
         <p:nvPicPr>
-          <p:cNvPr id="6" name="Image 5"/>
+          <p:cNvPr id="8" name="Image 7"/>
           <p:cNvPicPr>
             <a:picLocks noChangeAspect="1"/>
           </p:cNvPicPr>
@@ -8787,8 +9455,8 @@
         </p:blipFill>
         <p:spPr>
           <a:xfrm>
-            <a:off x="-178723" y="2255520"/>
-            <a:ext cx="12438258" cy="2326166"/>
+            <a:off x="3162300" y="0"/>
+            <a:ext cx="6396409" cy="6556606"/>
           </a:xfrm>
           <a:prstGeom prst="rect">
             <a:avLst/>
@@ -8798,7 +9466,7 @@
     </p:spTree>
     <p:extLst>
       <p:ext uri="{BB962C8B-B14F-4D97-AF65-F5344CB8AC3E}">
-        <p14:creationId xmlns:p14="http://schemas.microsoft.com/office/powerpoint/2010/main" val="4147630261"/>
+        <p14:creationId xmlns:p14="http://schemas.microsoft.com/office/powerpoint/2010/main" val="3377595523"/>
       </p:ext>
     </p:extLst>
   </p:cSld>
@@ -8811,7 +9479,83 @@
   <p:timing>
     <p:tnLst>
       <p:par>
-        <p:cTn id="1" dur="indefinite" restart="never" nodeType="tmRoot"/>
+        <p:cTn id="1" dur="indefinite" restart="never" nodeType="tmRoot">
+          <p:childTnLst>
+            <p:seq concurrent="1" nextAc="seek">
+              <p:cTn id="2" dur="indefinite" nodeType="mainSeq">
+                <p:childTnLst>
+                  <p:par>
+                    <p:cTn id="3" fill="hold">
+                      <p:stCondLst>
+                        <p:cond delay="indefinite"/>
+                      </p:stCondLst>
+                      <p:childTnLst>
+                        <p:par>
+                          <p:cTn id="4" fill="hold">
+                            <p:stCondLst>
+                              <p:cond delay="0"/>
+                            </p:stCondLst>
+                            <p:childTnLst>
+                              <p:par>
+                                <p:cTn id="5" presetID="10" presetClass="entr" presetSubtype="0" fill="hold" nodeType="clickEffect">
+                                  <p:stCondLst>
+                                    <p:cond delay="0"/>
+                                  </p:stCondLst>
+                                  <p:childTnLst>
+                                    <p:set>
+                                      <p:cBhvr>
+                                        <p:cTn id="6" dur="1" fill="hold">
+                                          <p:stCondLst>
+                                            <p:cond delay="0"/>
+                                          </p:stCondLst>
+                                        </p:cTn>
+                                        <p:tgtEl>
+                                          <p:spTgt spid="8"/>
+                                        </p:tgtEl>
+                                        <p:attrNameLst>
+                                          <p:attrName>style.visibility</p:attrName>
+                                        </p:attrNameLst>
+                                      </p:cBhvr>
+                                      <p:to>
+                                        <p:strVal val="visible"/>
+                                      </p:to>
+                                    </p:set>
+                                    <p:animEffect transition="in" filter="fade">
+                                      <p:cBhvr>
+                                        <p:cTn id="7" dur="250"/>
+                                        <p:tgtEl>
+                                          <p:spTgt spid="8"/>
+                                        </p:tgtEl>
+                                      </p:cBhvr>
+                                    </p:animEffect>
+                                  </p:childTnLst>
+                                </p:cTn>
+                              </p:par>
+                            </p:childTnLst>
+                          </p:cTn>
+                        </p:par>
+                      </p:childTnLst>
+                    </p:cTn>
+                  </p:par>
+                </p:childTnLst>
+              </p:cTn>
+              <p:prevCondLst>
+                <p:cond evt="onPrev" delay="0">
+                  <p:tgtEl>
+                    <p:sldTgt/>
+                  </p:tgtEl>
+                </p:cond>
+              </p:prevCondLst>
+              <p:nextCondLst>
+                <p:cond evt="onNext" delay="0">
+                  <p:tgtEl>
+                    <p:sldTgt/>
+                  </p:tgtEl>
+                </p:cond>
+              </p:nextCondLst>
+            </p:seq>
+          </p:childTnLst>
+        </p:cTn>
       </p:par>
     </p:tnLst>
   </p:timing>
@@ -9058,4 +9802,265 @@
     </a:ext>
   </a:extLst>
 </a:theme>
+</file>
+
+<file path=ppt/theme/theme2.xml><?xml version="1.0" encoding="utf-8"?>
+<a:theme xmlns:a="http://schemas.openxmlformats.org/drawingml/2006/main" name="Thème Office">
+  <a:themeElements>
+    <a:clrScheme name="Office">
+      <a:dk1>
+        <a:sysClr val="windowText" lastClr="000000"/>
+      </a:dk1>
+      <a:lt1>
+        <a:sysClr val="window" lastClr="FFFFFF"/>
+      </a:lt1>
+      <a:dk2>
+        <a:srgbClr val="44546A"/>
+      </a:dk2>
+      <a:lt2>
+        <a:srgbClr val="E7E6E6"/>
+      </a:lt2>
+      <a:accent1>
+        <a:srgbClr val="5B9BD5"/>
+      </a:accent1>
+      <a:accent2>
+        <a:srgbClr val="ED7D31"/>
+      </a:accent2>
+      <a:accent3>
+        <a:srgbClr val="A5A5A5"/>
+      </a:accent3>
+      <a:accent4>
+        <a:srgbClr val="FFC000"/>
+      </a:accent4>
+      <a:accent5>
+        <a:srgbClr val="4472C4"/>
+      </a:accent5>
+      <a:accent6>
+        <a:srgbClr val="70AD47"/>
+      </a:accent6>
+      <a:hlink>
+        <a:srgbClr val="0563C1"/>
+      </a:hlink>
+      <a:folHlink>
+        <a:srgbClr val="954F72"/>
+      </a:folHlink>
+    </a:clrScheme>
+    <a:fontScheme name="Office">
+      <a:majorFont>
+        <a:latin typeface="Calibri Light" panose="020F0302020204030204"/>
+        <a:ea typeface=""/>
+        <a:cs typeface=""/>
+        <a:font script="Jpan" typeface="游ゴシック Light"/>
+        <a:font script="Hang" typeface="맑은 고딕"/>
+        <a:font script="Hans" typeface="等线 Light"/>
+        <a:font script="Hant" typeface="新細明體"/>
+        <a:font script="Arab" typeface="Times New Roman"/>
+        <a:font script="Hebr" typeface="Times New Roman"/>
+        <a:font script="Thai" typeface="Angsana New"/>
+        <a:font script="Ethi" typeface="Nyala"/>
+        <a:font script="Beng" typeface="Vrinda"/>
+        <a:font script="Gujr" typeface="Shruti"/>
+        <a:font script="Khmr" typeface="MoolBoran"/>
+        <a:font script="Knda" typeface="Tunga"/>
+        <a:font script="Guru" typeface="Raavi"/>
+        <a:font script="Cans" typeface="Euphemia"/>
+        <a:font script="Cher" typeface="Plantagenet Cherokee"/>
+        <a:font script="Yiii" typeface="Microsoft Yi Baiti"/>
+        <a:font script="Tibt" typeface="Microsoft Himalaya"/>
+        <a:font script="Thaa" typeface="MV Boli"/>
+        <a:font script="Deva" typeface="Mangal"/>
+        <a:font script="Telu" typeface="Gautami"/>
+        <a:font script="Taml" typeface="Latha"/>
+        <a:font script="Syrc" typeface="Estrangelo Edessa"/>
+        <a:font script="Orya" typeface="Kalinga"/>
+        <a:font script="Mlym" typeface="Kartika"/>
+        <a:font script="Laoo" typeface="DokChampa"/>
+        <a:font script="Sinh" typeface="Iskoola Pota"/>
+        <a:font script="Mong" typeface="Mongolian Baiti"/>
+        <a:font script="Viet" typeface="Times New Roman"/>
+        <a:font script="Uigh" typeface="Microsoft Uighur"/>
+        <a:font script="Geor" typeface="Sylfaen"/>
+      </a:majorFont>
+      <a:minorFont>
+        <a:latin typeface="Calibri" panose="020F0502020204030204"/>
+        <a:ea typeface=""/>
+        <a:cs typeface=""/>
+        <a:font script="Jpan" typeface="游ゴシック"/>
+        <a:font script="Hang" typeface="맑은 고딕"/>
+        <a:font script="Hans" typeface="等线"/>
+        <a:font script="Hant" typeface="新細明體"/>
+        <a:font script="Arab" typeface="Arial"/>
+        <a:font script="Hebr" typeface="Arial"/>
+        <a:font script="Thai" typeface="Cordia New"/>
+        <a:font script="Ethi" typeface="Nyala"/>
+        <a:font script="Beng" typeface="Vrinda"/>
+        <a:font script="Gujr" typeface="Shruti"/>
+        <a:font script="Khmr" typeface="DaunPenh"/>
+        <a:font script="Knda" typeface="Tunga"/>
+        <a:font script="Guru" typeface="Raavi"/>
+        <a:font script="Cans" typeface="Euphemia"/>
+        <a:font script="Cher" typeface="Plantagenet Cherokee"/>
+        <a:font script="Yiii" typeface="Microsoft Yi Baiti"/>
+        <a:font script="Tibt" typeface="Microsoft Himalaya"/>
+        <a:font script="Thaa" typeface="MV Boli"/>
+        <a:font script="Deva" typeface="Mangal"/>
+        <a:font script="Telu" typeface="Gautami"/>
+        <a:font script="Taml" typeface="Latha"/>
+        <a:font script="Syrc" typeface="Estrangelo Edessa"/>
+        <a:font script="Orya" typeface="Kalinga"/>
+        <a:font script="Mlym" typeface="Kartika"/>
+        <a:font script="Laoo" typeface="DokChampa"/>
+        <a:font script="Sinh" typeface="Iskoola Pota"/>
+        <a:font script="Mong" typeface="Mongolian Baiti"/>
+        <a:font script="Viet" typeface="Arial"/>
+        <a:font script="Uigh" typeface="Microsoft Uighur"/>
+        <a:font script="Geor" typeface="Sylfaen"/>
+      </a:minorFont>
+    </a:fontScheme>
+    <a:fmtScheme name="Office">
+      <a:fillStyleLst>
+        <a:solidFill>
+          <a:schemeClr val="phClr"/>
+        </a:solidFill>
+        <a:gradFill rotWithShape="1">
+          <a:gsLst>
+            <a:gs pos="0">
+              <a:schemeClr val="phClr">
+                <a:lumMod val="110000"/>
+                <a:satMod val="105000"/>
+                <a:tint val="67000"/>
+              </a:schemeClr>
+            </a:gs>
+            <a:gs pos="50000">
+              <a:schemeClr val="phClr">
+                <a:lumMod val="105000"/>
+                <a:satMod val="103000"/>
+                <a:tint val="73000"/>
+              </a:schemeClr>
+            </a:gs>
+            <a:gs pos="100000">
+              <a:schemeClr val="phClr">
+                <a:lumMod val="105000"/>
+                <a:satMod val="109000"/>
+                <a:tint val="81000"/>
+              </a:schemeClr>
+            </a:gs>
+          </a:gsLst>
+          <a:lin ang="5400000" scaled="0"/>
+        </a:gradFill>
+        <a:gradFill rotWithShape="1">
+          <a:gsLst>
+            <a:gs pos="0">
+              <a:schemeClr val="phClr">
+                <a:satMod val="103000"/>
+                <a:lumMod val="102000"/>
+                <a:tint val="94000"/>
+              </a:schemeClr>
+            </a:gs>
+            <a:gs pos="50000">
+              <a:schemeClr val="phClr">
+                <a:satMod val="110000"/>
+                <a:lumMod val="100000"/>
+                <a:shade val="100000"/>
+              </a:schemeClr>
+            </a:gs>
+            <a:gs pos="100000">
+              <a:schemeClr val="phClr">
+                <a:lumMod val="99000"/>
+                <a:satMod val="120000"/>
+                <a:shade val="78000"/>
+              </a:schemeClr>
+            </a:gs>
+          </a:gsLst>
+          <a:lin ang="5400000" scaled="0"/>
+        </a:gradFill>
+      </a:fillStyleLst>
+      <a:lnStyleLst>
+        <a:ln w="6350" cap="flat" cmpd="sng" algn="ctr">
+          <a:solidFill>
+            <a:schemeClr val="phClr"/>
+          </a:solidFill>
+          <a:prstDash val="solid"/>
+          <a:miter lim="800000"/>
+        </a:ln>
+        <a:ln w="12700" cap="flat" cmpd="sng" algn="ctr">
+          <a:solidFill>
+            <a:schemeClr val="phClr"/>
+          </a:solidFill>
+          <a:prstDash val="solid"/>
+          <a:miter lim="800000"/>
+        </a:ln>
+        <a:ln w="19050" cap="flat" cmpd="sng" algn="ctr">
+          <a:solidFill>
+            <a:schemeClr val="phClr"/>
+          </a:solidFill>
+          <a:prstDash val="solid"/>
+          <a:miter lim="800000"/>
+        </a:ln>
+      </a:lnStyleLst>
+      <a:effectStyleLst>
+        <a:effectStyle>
+          <a:effectLst/>
+        </a:effectStyle>
+        <a:effectStyle>
+          <a:effectLst/>
+        </a:effectStyle>
+        <a:effectStyle>
+          <a:effectLst>
+            <a:outerShdw blurRad="57150" dist="19050" dir="5400000" algn="ctr" rotWithShape="0">
+              <a:srgbClr val="000000">
+                <a:alpha val="63000"/>
+              </a:srgbClr>
+            </a:outerShdw>
+          </a:effectLst>
+        </a:effectStyle>
+      </a:effectStyleLst>
+      <a:bgFillStyleLst>
+        <a:solidFill>
+          <a:schemeClr val="phClr"/>
+        </a:solidFill>
+        <a:solidFill>
+          <a:schemeClr val="phClr">
+            <a:tint val="95000"/>
+            <a:satMod val="170000"/>
+          </a:schemeClr>
+        </a:solidFill>
+        <a:gradFill rotWithShape="1">
+          <a:gsLst>
+            <a:gs pos="0">
+              <a:schemeClr val="phClr">
+                <a:tint val="93000"/>
+                <a:satMod val="150000"/>
+                <a:shade val="98000"/>
+                <a:lumMod val="102000"/>
+              </a:schemeClr>
+            </a:gs>
+            <a:gs pos="50000">
+              <a:schemeClr val="phClr">
+                <a:tint val="98000"/>
+                <a:satMod val="130000"/>
+                <a:shade val="90000"/>
+                <a:lumMod val="103000"/>
+              </a:schemeClr>
+            </a:gs>
+            <a:gs pos="100000">
+              <a:schemeClr val="phClr">
+                <a:shade val="63000"/>
+                <a:satMod val="120000"/>
+              </a:schemeClr>
+            </a:gs>
+          </a:gsLst>
+          <a:lin ang="5400000" scaled="0"/>
+        </a:gradFill>
+      </a:bgFillStyleLst>
+    </a:fmtScheme>
+  </a:themeElements>
+  <a:objectDefaults/>
+  <a:extraClrSchemeLst/>
+  <a:extLst>
+    <a:ext uri="{05A4C25C-085E-4340-85A3-A5531E510DB2}">
+      <thm15:themeFamily xmlns:thm15="http://schemas.microsoft.com/office/thememl/2012/main" name="Office Theme" id="{62F939B6-93AF-4DB8-9C6B-D6C7DFDC589F}" vid="{4A3C46E8-61CC-4603-A589-7422A47A8E4A}"/>
+    </a:ext>
+  </a:extLst>
+</a:theme>
 </file>
</xml_diff>